<commit_message>
correction in ui elements
</commit_message>
<xml_diff>
--- a/Artifacts/CleverCare_team3_presentation.pptx
+++ b/Artifacts/CleverCare_team3_presentation.pptx
@@ -221,7 +221,7 @@
           <a:p>
             <a:fld id="{043B725B-653D-4166-A8E9-72A38A1847CF}" type="datetimeFigureOut">
               <a:rPr lang="en-US"/>
-              <a:t>12/12/16</a:t>
+              <a:t>12/12/2016</a:t>
             </a:fld>
             <a:endParaRPr/>
           </a:p>
@@ -386,7 +386,7 @@
           <a:p>
             <a:fld id="{783F64CD-0576-4A9A-BD06-7889D6E60BDC}" type="datetimeFigureOut">
               <a:rPr lang="en-US"/>
-              <a:t>12/12/16</a:t>
+              <a:t>12/12/2016</a:t>
             </a:fld>
             <a:endParaRPr/>
           </a:p>
@@ -721,7 +721,7 @@
           </a:lstStyle>
           <a:p>
             <a:r>
-              <a:rPr lang="en-US" smtClean="0"/>
+              <a:rPr lang="en-US"/>
               <a:t>Click to edit Master title style</a:t>
             </a:r>
             <a:endParaRPr/>
@@ -795,7 +795,7 @@
           </a:lstStyle>
           <a:p>
             <a:r>
-              <a:rPr lang="en-US" smtClean="0"/>
+              <a:rPr lang="en-US"/>
               <a:t>Click to edit Master subtitle style</a:t>
             </a:r>
             <a:endParaRPr/>
@@ -894,7 +894,7 @@
           <a:lstStyle/>
           <a:p>
             <a:r>
-              <a:rPr lang="en-US" smtClean="0"/>
+              <a:rPr lang="en-US"/>
               <a:t>Click to edit Master title style</a:t>
             </a:r>
             <a:endParaRPr/>
@@ -918,35 +918,35 @@
           <a:p>
             <a:pPr lvl="0"/>
             <a:r>
-              <a:rPr lang="en-US" smtClean="0"/>
+              <a:rPr lang="en-US"/>
               <a:t>Click to edit Master text styles</a:t>
             </a:r>
           </a:p>
           <a:p>
             <a:pPr lvl="1"/>
             <a:r>
-              <a:rPr lang="en-US" smtClean="0"/>
+              <a:rPr lang="en-US"/>
               <a:t>Second level</a:t>
             </a:r>
           </a:p>
           <a:p>
             <a:pPr lvl="2"/>
             <a:r>
-              <a:rPr lang="en-US" smtClean="0"/>
+              <a:rPr lang="en-US"/>
               <a:t>Third level</a:t>
             </a:r>
           </a:p>
           <a:p>
             <a:pPr lvl="3"/>
             <a:r>
-              <a:rPr lang="en-US" smtClean="0"/>
+              <a:rPr lang="en-US"/>
               <a:t>Fourth level</a:t>
             </a:r>
           </a:p>
           <a:p>
             <a:pPr lvl="4"/>
             <a:r>
-              <a:rPr lang="en-US" smtClean="0"/>
+              <a:rPr lang="en-US"/>
               <a:t>Fifth level</a:t>
             </a:r>
             <a:endParaRPr/>
@@ -989,7 +989,7 @@
           <a:p>
             <a:fld id="{37CC0096-1860-4642-9CD2-0079EA5E7CD1}" type="datetimeFigureOut">
               <a:rPr lang="en-US"/>
-              <a:t>12/12/16</a:t>
+              <a:t>12/12/2016</a:t>
             </a:fld>
             <a:endParaRPr/>
           </a:p>
@@ -1138,7 +1138,7 @@
           <a:lstStyle/>
           <a:p>
             <a:r>
-              <a:rPr lang="en-US" smtClean="0"/>
+              <a:rPr lang="en-US"/>
               <a:t>Click to edit Master title style</a:t>
             </a:r>
             <a:endParaRPr/>
@@ -1167,35 +1167,35 @@
           <a:p>
             <a:pPr lvl="0"/>
             <a:r>
-              <a:rPr lang="en-US" smtClean="0"/>
+              <a:rPr lang="en-US"/>
               <a:t>Click to edit Master text styles</a:t>
             </a:r>
           </a:p>
           <a:p>
             <a:pPr lvl="1"/>
             <a:r>
-              <a:rPr lang="en-US" smtClean="0"/>
+              <a:rPr lang="en-US"/>
               <a:t>Second level</a:t>
             </a:r>
           </a:p>
           <a:p>
             <a:pPr lvl="2"/>
             <a:r>
-              <a:rPr lang="en-US" smtClean="0"/>
+              <a:rPr lang="en-US"/>
               <a:t>Third level</a:t>
             </a:r>
           </a:p>
           <a:p>
             <a:pPr lvl="3"/>
             <a:r>
-              <a:rPr lang="en-US" smtClean="0"/>
+              <a:rPr lang="en-US"/>
               <a:t>Fourth level</a:t>
             </a:r>
           </a:p>
           <a:p>
             <a:pPr lvl="4"/>
             <a:r>
-              <a:rPr lang="en-US" smtClean="0"/>
+              <a:rPr lang="en-US"/>
               <a:t>Fifth level</a:t>
             </a:r>
             <a:endParaRPr/>
@@ -1238,7 +1238,7 @@
           <a:p>
             <a:fld id="{37CC0096-1860-4642-9CD2-0079EA5E7CD1}" type="datetimeFigureOut">
               <a:rPr lang="en-US"/>
-              <a:t>12/12/16</a:t>
+              <a:t>12/12/2016</a:t>
             </a:fld>
             <a:endParaRPr/>
           </a:p>
@@ -1325,7 +1325,7 @@
           <a:lstStyle/>
           <a:p>
             <a:r>
-              <a:rPr lang="en-US" smtClean="0"/>
+              <a:rPr lang="en-US"/>
               <a:t>Click to edit Master title style</a:t>
             </a:r>
             <a:endParaRPr/>
@@ -1353,35 +1353,35 @@
           <a:p>
             <a:pPr lvl="0"/>
             <a:r>
-              <a:rPr lang="en-US" smtClean="0"/>
+              <a:rPr lang="en-US"/>
               <a:t>Click to edit Master text styles</a:t>
             </a:r>
           </a:p>
           <a:p>
             <a:pPr lvl="1"/>
             <a:r>
-              <a:rPr lang="en-US" smtClean="0"/>
+              <a:rPr lang="en-US"/>
               <a:t>Second level</a:t>
             </a:r>
           </a:p>
           <a:p>
             <a:pPr lvl="2"/>
             <a:r>
-              <a:rPr lang="en-US" smtClean="0"/>
+              <a:rPr lang="en-US"/>
               <a:t>Third level</a:t>
             </a:r>
           </a:p>
           <a:p>
             <a:pPr lvl="3"/>
             <a:r>
-              <a:rPr lang="en-US" smtClean="0"/>
+              <a:rPr lang="en-US"/>
               <a:t>Fourth level</a:t>
             </a:r>
           </a:p>
           <a:p>
             <a:pPr lvl="4"/>
             <a:r>
-              <a:rPr lang="en-US" smtClean="0"/>
+              <a:rPr lang="en-US"/>
               <a:t>Fifth level</a:t>
             </a:r>
             <a:endParaRPr/>
@@ -1424,7 +1424,7 @@
           <a:p>
             <a:fld id="{37CC0096-1860-4642-9CD2-0079EA5E7CD1}" type="datetimeFigureOut">
               <a:rPr lang="en-US"/>
-              <a:t>12/12/16</a:t>
+              <a:t>12/12/2016</a:t>
             </a:fld>
             <a:endParaRPr/>
           </a:p>
@@ -1602,7 +1602,7 @@
           </a:lstStyle>
           <a:p>
             <a:r>
-              <a:rPr lang="en-US" smtClean="0"/>
+              <a:rPr lang="en-US"/>
               <a:t>Click to edit Master title style</a:t>
             </a:r>
             <a:endParaRPr/>
@@ -1674,7 +1674,7 @@
           <a:p>
             <a:pPr lvl="0"/>
             <a:r>
-              <a:rPr lang="en-US" smtClean="0"/>
+              <a:rPr lang="en-US"/>
               <a:t>Click to edit Master text styles</a:t>
             </a:r>
           </a:p>
@@ -1738,7 +1738,7 @@
           <a:lstStyle/>
           <a:p>
             <a:r>
-              <a:rPr lang="en-US" smtClean="0"/>
+              <a:rPr lang="en-US"/>
               <a:t>Click to edit Master title style</a:t>
             </a:r>
             <a:endParaRPr/>
@@ -1797,35 +1797,35 @@
           <a:p>
             <a:pPr lvl="0"/>
             <a:r>
-              <a:rPr lang="en-US" smtClean="0"/>
+              <a:rPr lang="en-US"/>
               <a:t>Click to edit Master text styles</a:t>
             </a:r>
           </a:p>
           <a:p>
             <a:pPr lvl="1"/>
             <a:r>
-              <a:rPr lang="en-US" smtClean="0"/>
+              <a:rPr lang="en-US"/>
               <a:t>Second level</a:t>
             </a:r>
           </a:p>
           <a:p>
             <a:pPr lvl="2"/>
             <a:r>
-              <a:rPr lang="en-US" smtClean="0"/>
+              <a:rPr lang="en-US"/>
               <a:t>Third level</a:t>
             </a:r>
           </a:p>
           <a:p>
             <a:pPr lvl="3"/>
             <a:r>
-              <a:rPr lang="en-US" smtClean="0"/>
+              <a:rPr lang="en-US"/>
               <a:t>Fourth level</a:t>
             </a:r>
           </a:p>
           <a:p>
             <a:pPr lvl="4"/>
             <a:r>
-              <a:rPr lang="en-US" smtClean="0"/>
+              <a:rPr lang="en-US"/>
               <a:t>Fifth level</a:t>
             </a:r>
             <a:endParaRPr/>
@@ -1884,35 +1884,35 @@
           <a:p>
             <a:pPr lvl="0"/>
             <a:r>
-              <a:rPr lang="en-US" smtClean="0"/>
+              <a:rPr lang="en-US"/>
               <a:t>Click to edit Master text styles</a:t>
             </a:r>
           </a:p>
           <a:p>
             <a:pPr lvl="1"/>
             <a:r>
-              <a:rPr lang="en-US" smtClean="0"/>
+              <a:rPr lang="en-US"/>
               <a:t>Second level</a:t>
             </a:r>
           </a:p>
           <a:p>
             <a:pPr lvl="2"/>
             <a:r>
-              <a:rPr lang="en-US" smtClean="0"/>
+              <a:rPr lang="en-US"/>
               <a:t>Third level</a:t>
             </a:r>
           </a:p>
           <a:p>
             <a:pPr lvl="3"/>
             <a:r>
-              <a:rPr lang="en-US" smtClean="0"/>
+              <a:rPr lang="en-US"/>
               <a:t>Fourth level</a:t>
             </a:r>
           </a:p>
           <a:p>
             <a:pPr lvl="4"/>
             <a:r>
-              <a:rPr lang="en-US" smtClean="0"/>
+              <a:rPr lang="en-US"/>
               <a:t>Fifth level</a:t>
             </a:r>
             <a:endParaRPr/>
@@ -1955,7 +1955,7 @@
           <a:p>
             <a:fld id="{37CC0096-1860-4642-9CD2-0079EA5E7CD1}" type="datetimeFigureOut">
               <a:rPr lang="en-US"/>
-              <a:t>12/12/16</a:t>
+              <a:t>12/12/2016</a:t>
             </a:fld>
             <a:endParaRPr/>
           </a:p>
@@ -2042,7 +2042,7 @@
           <a:lstStyle/>
           <a:p>
             <a:r>
-              <a:rPr lang="en-US" smtClean="0"/>
+              <a:rPr lang="en-US"/>
               <a:t>Click to edit Master title style</a:t>
             </a:r>
             <a:endParaRPr/>
@@ -2117,7 +2117,7 @@
           <a:p>
             <a:pPr lvl="0"/>
             <a:r>
-              <a:rPr lang="en-US" smtClean="0"/>
+              <a:rPr lang="en-US"/>
               <a:t>Click to edit Master text styles</a:t>
             </a:r>
           </a:p>
@@ -2175,35 +2175,35 @@
           <a:p>
             <a:pPr lvl="0"/>
             <a:r>
-              <a:rPr lang="en-US" smtClean="0"/>
+              <a:rPr lang="en-US"/>
               <a:t>Click to edit Master text styles</a:t>
             </a:r>
           </a:p>
           <a:p>
             <a:pPr lvl="1"/>
             <a:r>
-              <a:rPr lang="en-US" smtClean="0"/>
+              <a:rPr lang="en-US"/>
               <a:t>Second level</a:t>
             </a:r>
           </a:p>
           <a:p>
             <a:pPr lvl="2"/>
             <a:r>
-              <a:rPr lang="en-US" smtClean="0"/>
+              <a:rPr lang="en-US"/>
               <a:t>Third level</a:t>
             </a:r>
           </a:p>
           <a:p>
             <a:pPr lvl="3"/>
             <a:r>
-              <a:rPr lang="en-US" smtClean="0"/>
+              <a:rPr lang="en-US"/>
               <a:t>Fourth level</a:t>
             </a:r>
           </a:p>
           <a:p>
             <a:pPr lvl="4"/>
             <a:r>
-              <a:rPr lang="en-US" smtClean="0"/>
+              <a:rPr lang="en-US"/>
               <a:t>Fifth level</a:t>
             </a:r>
             <a:endParaRPr/>
@@ -2278,7 +2278,7 @@
           <a:p>
             <a:pPr lvl="0"/>
             <a:r>
-              <a:rPr lang="en-US" smtClean="0"/>
+              <a:rPr lang="en-US"/>
               <a:t>Click to edit Master text styles</a:t>
             </a:r>
           </a:p>
@@ -2336,35 +2336,35 @@
           <a:p>
             <a:pPr lvl="0"/>
             <a:r>
-              <a:rPr lang="en-US" smtClean="0"/>
+              <a:rPr lang="en-US"/>
               <a:t>Click to edit Master text styles</a:t>
             </a:r>
           </a:p>
           <a:p>
             <a:pPr lvl="1"/>
             <a:r>
-              <a:rPr lang="en-US" smtClean="0"/>
+              <a:rPr lang="en-US"/>
               <a:t>Second level</a:t>
             </a:r>
           </a:p>
           <a:p>
             <a:pPr lvl="2"/>
             <a:r>
-              <a:rPr lang="en-US" smtClean="0"/>
+              <a:rPr lang="en-US"/>
               <a:t>Third level</a:t>
             </a:r>
           </a:p>
           <a:p>
             <a:pPr lvl="3"/>
             <a:r>
-              <a:rPr lang="en-US" smtClean="0"/>
+              <a:rPr lang="en-US"/>
               <a:t>Fourth level</a:t>
             </a:r>
           </a:p>
           <a:p>
             <a:pPr lvl="4"/>
             <a:r>
-              <a:rPr lang="en-US" smtClean="0"/>
+              <a:rPr lang="en-US"/>
               <a:t>Fifth level</a:t>
             </a:r>
             <a:endParaRPr/>
@@ -2407,7 +2407,7 @@
           <a:p>
             <a:fld id="{37CC0096-1860-4642-9CD2-0079EA5E7CD1}" type="datetimeFigureOut">
               <a:rPr lang="en-US"/>
-              <a:t>12/12/16</a:t>
+              <a:t>12/12/2016</a:t>
             </a:fld>
             <a:endParaRPr/>
           </a:p>
@@ -2494,7 +2494,7 @@
           <a:lstStyle/>
           <a:p>
             <a:r>
-              <a:rPr lang="en-US" smtClean="0"/>
+              <a:rPr lang="en-US"/>
               <a:t>Click to edit Master title style</a:t>
             </a:r>
             <a:endParaRPr/>
@@ -2537,7 +2537,7 @@
           <a:p>
             <a:fld id="{37CC0096-1860-4642-9CD2-0079EA5E7CD1}" type="datetimeFigureOut">
               <a:rPr lang="en-US"/>
-              <a:t>12/12/16</a:t>
+              <a:t>12/12/2016</a:t>
             </a:fld>
             <a:endParaRPr/>
           </a:p>
@@ -2644,7 +2644,7 @@
           <a:p>
             <a:fld id="{37CC0096-1860-4642-9CD2-0079EA5E7CD1}" type="datetimeFigureOut">
               <a:rPr lang="en-US"/>
-              <a:t>12/12/16</a:t>
+              <a:t>12/12/2016</a:t>
             </a:fld>
             <a:endParaRPr/>
           </a:p>
@@ -2859,7 +2859,7 @@
           </a:lstStyle>
           <a:p>
             <a:r>
-              <a:rPr lang="en-US" smtClean="0"/>
+              <a:rPr lang="en-US"/>
               <a:t>Click to edit Master title style</a:t>
             </a:r>
             <a:endParaRPr/>
@@ -2918,35 +2918,35 @@
           <a:p>
             <a:pPr lvl="0"/>
             <a:r>
-              <a:rPr lang="en-US" smtClean="0"/>
+              <a:rPr lang="en-US"/>
               <a:t>Click to edit Master text styles</a:t>
             </a:r>
           </a:p>
           <a:p>
             <a:pPr lvl="1"/>
             <a:r>
-              <a:rPr lang="en-US" smtClean="0"/>
+              <a:rPr lang="en-US"/>
               <a:t>Second level</a:t>
             </a:r>
           </a:p>
           <a:p>
             <a:pPr lvl="2"/>
             <a:r>
-              <a:rPr lang="en-US" smtClean="0"/>
+              <a:rPr lang="en-US"/>
               <a:t>Third level</a:t>
             </a:r>
           </a:p>
           <a:p>
             <a:pPr lvl="3"/>
             <a:r>
-              <a:rPr lang="en-US" smtClean="0"/>
+              <a:rPr lang="en-US"/>
               <a:t>Fourth level</a:t>
             </a:r>
           </a:p>
           <a:p>
             <a:pPr lvl="4"/>
             <a:r>
-              <a:rPr lang="en-US" smtClean="0"/>
+              <a:rPr lang="en-US"/>
               <a:t>Fifth level</a:t>
             </a:r>
             <a:endParaRPr/>
@@ -3018,7 +3018,7 @@
           <a:p>
             <a:pPr lvl="0"/>
             <a:r>
-              <a:rPr lang="en-US" smtClean="0"/>
+              <a:rPr lang="en-US"/>
               <a:t>Click to edit Master text styles</a:t>
             </a:r>
           </a:p>
@@ -3210,7 +3210,7 @@
           </a:lstStyle>
           <a:p>
             <a:r>
-              <a:rPr lang="en-US" smtClean="0"/>
+              <a:rPr lang="en-US"/>
               <a:t>Click to edit Master title style</a:t>
             </a:r>
             <a:endParaRPr/>
@@ -3277,7 +3277,7 @@
           </a:lstStyle>
           <a:p>
             <a:r>
-              <a:rPr lang="en-US" smtClean="0"/>
+              <a:rPr lang="en-US"/>
               <a:t>Drag picture to placeholder or click icon to add</a:t>
             </a:r>
             <a:endParaRPr dirty="0"/>
@@ -3347,7 +3347,7 @@
           <a:p>
             <a:pPr lvl="0"/>
             <a:r>
-              <a:rPr lang="en-US" smtClean="0"/>
+              <a:rPr lang="en-US"/>
               <a:t>Click to edit Master text styles</a:t>
             </a:r>
           </a:p>
@@ -3495,7 +3495,7 @@
           <a:lstStyle/>
           <a:p>
             <a:r>
-              <a:rPr lang="en-US" smtClean="0"/>
+              <a:rPr lang="en-US"/>
               <a:t>Click to edit Master title style</a:t>
             </a:r>
             <a:endParaRPr dirty="0"/>
@@ -3529,35 +3529,35 @@
           <a:p>
             <a:pPr lvl="0"/>
             <a:r>
-              <a:rPr lang="en-US" smtClean="0"/>
+              <a:rPr lang="en-US"/>
               <a:t>Click to edit Master text styles</a:t>
             </a:r>
           </a:p>
           <a:p>
             <a:pPr lvl="1"/>
             <a:r>
-              <a:rPr lang="en-US" smtClean="0"/>
+              <a:rPr lang="en-US"/>
               <a:t>Second level</a:t>
             </a:r>
           </a:p>
           <a:p>
             <a:pPr lvl="2"/>
             <a:r>
-              <a:rPr lang="en-US" smtClean="0"/>
+              <a:rPr lang="en-US"/>
               <a:t>Third level</a:t>
             </a:r>
           </a:p>
           <a:p>
             <a:pPr lvl="3"/>
             <a:r>
-              <a:rPr lang="en-US" smtClean="0"/>
+              <a:rPr lang="en-US"/>
               <a:t>Fourth level</a:t>
             </a:r>
           </a:p>
           <a:p>
             <a:pPr lvl="4"/>
             <a:r>
-              <a:rPr lang="en-US" smtClean="0"/>
+              <a:rPr lang="en-US"/>
               <a:t>Fifth level</a:t>
             </a:r>
             <a:endParaRPr dirty="0"/>
@@ -3633,7 +3633,7 @@
             <a:fld id="{37CC0096-1860-4642-9CD2-0079EA5E7CD1}" type="datetimeFigureOut">
               <a:rPr lang="en-US" smtClean="0"/>
               <a:pPr/>
-              <a:t>12/12/16</a:t>
+              <a:t>12/12/2016</a:t>
             </a:fld>
             <a:endParaRPr lang="en-US" dirty="0"/>
           </a:p>
@@ -4080,10 +4080,9 @@
           <a:lstStyle/>
           <a:p>
             <a:r>
-              <a:rPr lang="en-US" dirty="0" smtClean="0"/>
+              <a:rPr lang="en-US" dirty="0"/>
               <a:t>CleverCare</a:t>
             </a:r>
-            <a:endParaRPr lang="en-US" dirty="0"/>
           </a:p>
         </p:txBody>
       </p:sp>
@@ -4108,11 +4107,11 @@
           <a:lstStyle/>
           <a:p>
             <a:r>
-              <a:rPr lang="en-US" dirty="0" smtClean="0"/>
+              <a:rPr lang="en-US" dirty="0"/>
               <a:t>Reducing </a:t>
             </a:r>
             <a:r>
-              <a:rPr lang="en-US" smtClean="0"/>
+              <a:rPr lang="en-US"/>
               <a:t>Hospital readmissions</a:t>
             </a:r>
             <a:endParaRPr lang="en-US" dirty="0"/>
@@ -4141,13 +4140,6 @@
       </p:transition>
     </mc:Fallback>
   </mc:AlternateContent>
-  <p:timing>
-    <p:tnLst>
-      <p:par>
-        <p:cTn id="1" dur="indefinite" restart="never" nodeType="tmRoot"/>
-      </p:par>
-    </p:tnLst>
-  </p:timing>
 </p:sld>
 </file>
 
@@ -4184,10 +4176,9 @@
           <a:lstStyle/>
           <a:p>
             <a:r>
-              <a:rPr lang="en-US" dirty="0" smtClean="0"/>
+              <a:rPr lang="en-US" dirty="0"/>
               <a:t>What is readmission?</a:t>
             </a:r>
-            <a:endParaRPr lang="en-US" dirty="0"/>
           </a:p>
         </p:txBody>
       </p:sp>
@@ -4223,13 +4214,8 @@
             </a:r>
             <a:r>
               <a:rPr lang="en-US" sz="2200" dirty="0"/>
-              <a:t> is an episode when a patient who had been discharged from a hospital is admitted again within a specified time interval</a:t>
-            </a:r>
-            <a:r>
-              <a:rPr lang="en-US" sz="2200" dirty="0" smtClean="0"/>
-              <a:t>.</a:t>
-            </a:r>
-            <a:endParaRPr lang="en-US" sz="2200" dirty="0"/>
+              <a:t> is an episode when a patient who had been discharged from a hospital is admitted again within a specified time interval.</a:t>
+            </a:r>
           </a:p>
         </p:txBody>
       </p:sp>
@@ -4285,13 +4271,6 @@
       </p:transition>
     </mc:Fallback>
   </mc:AlternateContent>
-  <p:timing>
-    <p:tnLst>
-      <p:par>
-        <p:cTn id="1" dur="indefinite" restart="never" nodeType="tmRoot"/>
-      </p:par>
-    </p:tnLst>
-  </p:timing>
 </p:sld>
 </file>
 
@@ -4328,10 +4307,9 @@
           <a:lstStyle/>
           <a:p>
             <a:r>
-              <a:rPr lang="en-US" dirty="0" smtClean="0"/>
+              <a:rPr lang="en-US" dirty="0"/>
               <a:t>The problem</a:t>
             </a:r>
-            <a:endParaRPr lang="en-US" dirty="0"/>
           </a:p>
         </p:txBody>
       </p:sp>
@@ -4354,35 +4332,17 @@
               <a:rPr lang="en-US" dirty="0"/>
               <a:t>Nearly 20% of all discharges had a readmission within 30 days. </a:t>
             </a:r>
-            <a:endParaRPr lang="en-US" dirty="0" smtClean="0"/>
-          </a:p>
-          <a:p>
-            <a:r>
-              <a:rPr lang="en-US" dirty="0" smtClean="0"/>
-              <a:t>Among </a:t>
-            </a:r>
+          </a:p>
+          <a:p>
             <a:r>
               <a:rPr lang="en-US" dirty="0"/>
-              <a:t>this, an estimated 12% of readmissions are avoidable. Even if 10% of these readmissions are prevented, it can save up to $1 billion which is a huge amount.</a:t>
-            </a:r>
+              <a:t>Among this, an estimated 12% of readmissions are avoidable. Even if 10% of these readmissions are prevented, it can save up to $1 billion which is a huge amount. </a:t>
+            </a:r>
+          </a:p>
+          <a:p>
             <a:r>
               <a:rPr lang="en-US" dirty="0"/>
-              <a:t> </a:t>
-            </a:r>
-            <a:endParaRPr lang="en-US" dirty="0" smtClean="0"/>
-          </a:p>
-          <a:p>
-            <a:r>
-              <a:rPr lang="en-US" dirty="0" smtClean="0"/>
-              <a:t>Hospitals </a:t>
-            </a:r>
-            <a:r>
-              <a:rPr lang="en-US" dirty="0"/>
-              <a:t>are charged penalty for excess readmissions of patients that could have been avoided otherwise.</a:t>
-            </a:r>
-            <a:r>
-              <a:rPr lang="en-US" dirty="0"/>
-              <a:t> </a:t>
+              <a:t>Hospitals are charged penalty for excess readmissions of patients that could have been avoided otherwise. </a:t>
             </a:r>
           </a:p>
         </p:txBody>
@@ -4409,13 +4369,6 @@
       </p:transition>
     </mc:Fallback>
   </mc:AlternateContent>
-  <p:timing>
-    <p:tnLst>
-      <p:par>
-        <p:cTn id="1" dur="indefinite" restart="never" nodeType="tmRoot"/>
-      </p:par>
-    </p:tnLst>
-  </p:timing>
 </p:sld>
 </file>
 
@@ -4452,10 +4405,9 @@
           <a:lstStyle/>
           <a:p>
             <a:r>
-              <a:rPr lang="en-US" dirty="0" smtClean="0"/>
+              <a:rPr lang="en-US" dirty="0"/>
               <a:t>Some intervention methods</a:t>
             </a:r>
-            <a:endParaRPr lang="en-US" dirty="0"/>
           </a:p>
         </p:txBody>
       </p:sp>
@@ -4480,46 +4432,25 @@
           <a:lstStyle/>
           <a:p>
             <a:r>
-              <a:rPr lang="en-US" dirty="0" smtClean="0"/>
-              <a:t>Improved </a:t>
-            </a:r>
-            <a:r>
               <a:rPr lang="en-US" dirty="0"/>
-              <a:t>patient education and self-management </a:t>
-            </a:r>
-            <a:r>
-              <a:rPr lang="en-US" dirty="0" smtClean="0"/>
-              <a:t>support. </a:t>
-            </a:r>
-          </a:p>
-          <a:p>
-            <a:r>
-              <a:rPr lang="en-US" dirty="0" smtClean="0"/>
-              <a:t>Early post-discharge </a:t>
-            </a:r>
+              <a:t>Improved patient education and self-management support. </a:t>
+            </a:r>
+          </a:p>
+          <a:p>
             <a:r>
               <a:rPr lang="en-US" dirty="0"/>
-              <a:t>follow-ups.</a:t>
-            </a:r>
-            <a:endParaRPr lang="en-US" dirty="0" smtClean="0"/>
-          </a:p>
-          <a:p>
-            <a:r>
-              <a:rPr lang="en-US" dirty="0" smtClean="0"/>
-              <a:t>Improved </a:t>
-            </a:r>
+              <a:t>Early post-discharge follow-ups.</a:t>
+            </a:r>
+          </a:p>
+          <a:p>
             <a:r>
               <a:rPr lang="en-US" dirty="0"/>
-              <a:t>discharge </a:t>
-            </a:r>
-            <a:r>
-              <a:rPr lang="en-US" dirty="0" smtClean="0"/>
-              <a:t>process.</a:t>
-            </a:r>
-          </a:p>
-          <a:p>
-            <a:r>
-              <a:rPr lang="en-US" dirty="0" smtClean="0"/>
+              <a:t>Improved discharge process.</a:t>
+            </a:r>
+          </a:p>
+          <a:p>
+            <a:r>
+              <a:rPr lang="en-US" dirty="0"/>
               <a:t>Remote monitoring.</a:t>
             </a:r>
           </a:p>
@@ -4550,13 +4481,6 @@
       </p:transition>
     </mc:Fallback>
   </mc:AlternateContent>
-  <p:timing>
-    <p:tnLst>
-      <p:par>
-        <p:cTn id="1" dur="indefinite" restart="never" nodeType="tmRoot"/>
-      </p:par>
-    </p:tnLst>
-  </p:timing>
 </p:sld>
 </file>
 
@@ -4593,10 +4517,9 @@
           <a:lstStyle/>
           <a:p>
             <a:r>
-              <a:rPr lang="en-US" dirty="0" smtClean="0"/>
+              <a:rPr lang="en-US" dirty="0"/>
               <a:t>Our solution</a:t>
             </a:r>
-            <a:endParaRPr lang="en-US" dirty="0"/>
           </a:p>
         </p:txBody>
       </p:sp>
@@ -4621,46 +4544,29 @@
           <a:lstStyle/>
           <a:p>
             <a:r>
-              <a:rPr lang="en-US" dirty="0" smtClean="0"/>
-              <a:t>Improved </a:t>
-            </a:r>
-            <a:r>
               <a:rPr lang="en-US" dirty="0"/>
-              <a:t>patient education and self-management </a:t>
-            </a:r>
-            <a:r>
-              <a:rPr lang="en-US" dirty="0" smtClean="0"/>
-              <a:t>support. </a:t>
+              <a:t>Improved patient education and self-management support. </a:t>
             </a:r>
           </a:p>
           <a:p>
             <a:pPr lvl="1"/>
             <a:r>
-              <a:rPr lang="en-US" dirty="0" smtClean="0"/>
+              <a:rPr lang="en-US" dirty="0"/>
               <a:t>Doctor can send educational content and suggestions(notes) by reviewing patient’s follow-up.</a:t>
             </a:r>
           </a:p>
           <a:p>
             <a:r>
-              <a:rPr lang="en-US" dirty="0" smtClean="0"/>
-              <a:t>Early post-discharge </a:t>
-            </a:r>
-            <a:r>
               <a:rPr lang="en-US" dirty="0"/>
-              <a:t>follow-ups</a:t>
-            </a:r>
-            <a:r>
-              <a:rPr lang="en-US" dirty="0" smtClean="0"/>
-              <a:t>.</a:t>
+              <a:t>Early post-discharge follow-ups.</a:t>
             </a:r>
           </a:p>
           <a:p>
             <a:pPr lvl="1"/>
             <a:r>
-              <a:rPr lang="en-US" dirty="0" smtClean="0"/>
+              <a:rPr lang="en-US" dirty="0"/>
               <a:t>Predicting the chances of readmission of a patient based on the inputs taken in the follow-up.</a:t>
             </a:r>
-            <a:endParaRPr lang="en-US" dirty="0"/>
           </a:p>
         </p:txBody>
       </p:sp>
@@ -4686,13 +4592,6 @@
       </p:transition>
     </mc:Fallback>
   </mc:AlternateContent>
-  <p:timing>
-    <p:tnLst>
-      <p:par>
-        <p:cTn id="1" dur="indefinite" restart="never" nodeType="tmRoot"/>
-      </p:par>
-    </p:tnLst>
-  </p:timing>
 </p:sld>
 </file>
 
@@ -4729,10 +4628,9 @@
           <a:lstStyle/>
           <a:p>
             <a:r>
-              <a:rPr lang="en-US" dirty="0" smtClean="0"/>
+              <a:rPr lang="en-US" dirty="0"/>
               <a:t>Flow diagram</a:t>
             </a:r>
-            <a:endParaRPr lang="en-US" dirty="0"/>
           </a:p>
         </p:txBody>
       </p:sp>
@@ -4760,8 +4658,8 @@
         </p:blipFill>
         <p:spPr>
           <a:xfrm>
-            <a:off x="2514291" y="1828800"/>
-            <a:ext cx="7163417" cy="4572000"/>
+            <a:off x="1905000" y="1731729"/>
+            <a:ext cx="7924799" cy="5057947"/>
           </a:xfrm>
         </p:spPr>
       </p:pic>
@@ -4787,13 +4685,6 @@
       </p:transition>
     </mc:Fallback>
   </mc:AlternateContent>
-  <p:timing>
-    <p:tnLst>
-      <p:par>
-        <p:cTn id="1" dur="indefinite" restart="never" nodeType="tmRoot"/>
-      </p:par>
-    </p:tnLst>
-  </p:timing>
 </p:sld>
 </file>
 
@@ -4830,10 +4721,9 @@
           <a:lstStyle/>
           <a:p>
             <a:r>
-              <a:rPr lang="en-US" dirty="0" smtClean="0"/>
+              <a:rPr lang="en-US" dirty="0"/>
               <a:t>Links</a:t>
             </a:r>
-            <a:endParaRPr lang="en-US" dirty="0"/>
           </a:p>
         </p:txBody>
       </p:sp>
@@ -4878,16 +4768,26 @@
           </a:p>
           <a:p>
             <a:r>
-              <a:rPr lang="en-US" dirty="0" smtClean="0"/>
+              <a:rPr lang="en-US" dirty="0"/>
               <a:t>Introductory video: </a:t>
             </a:r>
-          </a:p>
-          <a:p>
-            <a:r>
-              <a:rPr lang="en-US" dirty="0" smtClean="0"/>
+            <a:r>
+              <a:rPr lang="en-US" sz="1800" u="sng" dirty="0"/>
+              <a:t>https://www.youtube.com/watch?v=NZ78HN0rBDo</a:t>
+            </a:r>
+          </a:p>
+          <a:p>
+            <a:r>
+              <a:rPr lang="en-US" dirty="0"/>
               <a:t>Demo of application: </a:t>
             </a:r>
-            <a:endParaRPr lang="en-US" dirty="0"/>
+            <a:r>
+              <a:rPr lang="en-US" sz="1800" u="sng" dirty="0">
+                <a:hlinkClick r:id="rId4"/>
+              </a:rPr>
+              <a:t>https://youtu.be/1EiYRQDF75I</a:t>
+            </a:r>
+            <a:endParaRPr lang="en-US" sz="1800" u="sng" dirty="0"/>
           </a:p>
         </p:txBody>
       </p:sp>
@@ -4913,13 +4813,6 @@
       </p:transition>
     </mc:Fallback>
   </mc:AlternateContent>
-  <p:timing>
-    <p:tnLst>
-      <p:par>
-        <p:cTn id="1" dur="indefinite" restart="never" nodeType="tmRoot"/>
-      </p:par>
-    </p:tnLst>
-  </p:timing>
 </p:sld>
 </file>
 
@@ -4956,10 +4849,9 @@
           <a:lstStyle/>
           <a:p>
             <a:r>
-              <a:rPr lang="en-US" dirty="0" smtClean="0"/>
+              <a:rPr lang="en-US" dirty="0"/>
               <a:t>References</a:t>
             </a:r>
-            <a:endParaRPr lang="en-US" dirty="0"/>
           </a:p>
         </p:txBody>
       </p:sp>
@@ -5185,16 +5077,10 @@
           <a:p>
             <a:pPr lvl="0"/>
             <a:r>
-              <a:rPr lang="en-US" sz="1800" u="sng" dirty="0" smtClean="0">
-                <a:hlinkClick r:id="rId2"/>
-              </a:rPr>
-              <a:t>https</a:t>
-            </a:r>
-            <a:r>
               <a:rPr lang="en-US" sz="1800" u="sng" dirty="0">
                 <a:hlinkClick r:id="rId2"/>
               </a:rPr>
-              <a:t>://www.healthcatalyst.com/CMS-reporting-requirements-4-changes-2014</a:t>
+              <a:t>https://www.healthcatalyst.com/CMS-reporting-requirements-4-changes-2014</a:t>
             </a:r>
             <a:r>
               <a:rPr lang="en-US" sz="1800" dirty="0"/>
@@ -5290,13 +5176,6 @@
       </p:transition>
     </mc:Fallback>
   </mc:AlternateContent>
-  <p:timing>
-    <p:tnLst>
-      <p:par>
-        <p:cTn id="1" dur="indefinite" restart="never" nodeType="tmRoot"/>
-      </p:par>
-    </p:tnLst>
-  </p:timing>
 </p:sld>
 </file>
 

</xml_diff>